<commit_message>
Updating to most recent powerpoint files with new logos
</commit_message>
<xml_diff>
--- a/src/assets/documents/EOC Development Tool/1 - What is an EOC and why do we need one/1-2020-what-is-an-EOC.pptx
+++ b/src/assets/documents/EOC Development Tool/1 - What is an EOC and why do we need one/1-2020-what-is-an-EOC.pptx
@@ -5469,7 +5469,7 @@
               <a:pPr>
                 <a:defRPr/>
               </a:pPr>
-              <a:t>5/25/20</a:t>
+              <a:t>6/26/20</a:t>
             </a:fld>
             <a:endParaRPr lang="en-US"/>
           </a:p>
@@ -8394,6 +8394,66 @@
           <a:chExt cx="0" cy="0"/>
         </a:xfrm>
       </p:grpSpPr>
+      <p:sp>
+        <p:nvSpPr>
+          <p:cNvPr id="16" name="Rounded Rectangle 15">
+            <a:extLst>
+              <a:ext uri="{FF2B5EF4-FFF2-40B4-BE49-F238E27FC236}">
+                <a16:creationId xmlns:a16="http://schemas.microsoft.com/office/drawing/2014/main" id="{EEEED746-E923-6546-AEBB-C34B388F17E3}"/>
+              </a:ext>
+              <a:ext uri="{C183D7F6-B498-43B3-948B-1728B52AA6E4}">
+                <adec:decorative xmlns:adec="http://schemas.microsoft.com/office/drawing/2017/decorative" val="1"/>
+              </a:ext>
+            </a:extLst>
+          </p:cNvPr>
+          <p:cNvSpPr/>
+          <p:nvPr userDrawn="1"/>
+        </p:nvSpPr>
+        <p:spPr>
+          <a:xfrm>
+            <a:off x="448071" y="3752495"/>
+            <a:ext cx="2202419" cy="779487"/>
+          </a:xfrm>
+          <a:prstGeom prst="roundRect">
+            <a:avLst>
+              <a:gd name="adj" fmla="val 20191"/>
+            </a:avLst>
+          </a:prstGeom>
+          <a:blipFill>
+            <a:blip r:embed="rId2"/>
+            <a:stretch>
+              <a:fillRect/>
+            </a:stretch>
+          </a:blipFill>
+          <a:ln>
+            <a:noFill/>
+          </a:ln>
+        </p:spPr>
+        <p:style>
+          <a:lnRef idx="2">
+            <a:schemeClr val="accent1">
+              <a:shade val="50000"/>
+            </a:schemeClr>
+          </a:lnRef>
+          <a:fillRef idx="1">
+            <a:schemeClr val="accent1"/>
+          </a:fillRef>
+          <a:effectRef idx="0">
+            <a:schemeClr val="accent1"/>
+          </a:effectRef>
+          <a:fontRef idx="minor">
+            <a:schemeClr val="lt1"/>
+          </a:fontRef>
+        </p:style>
+        <p:txBody>
+          <a:bodyPr rtlCol="0" anchor="ctr"/>
+          <a:lstStyle/>
+          <a:p>
+            <a:pPr algn="ctr"/>
+            <a:endParaRPr lang="en-US" dirty="0"/>
+          </a:p>
+        </p:txBody>
+      </p:sp>
       <p:pic>
         <p:nvPicPr>
           <p:cNvPr id="13" name="Picture 12">
@@ -8409,7 +8469,7 @@
           <p:nvPr userDrawn="1"/>
         </p:nvPicPr>
         <p:blipFill rotWithShape="1">
-          <a:blip r:embed="rId2" cstate="print">
+          <a:blip r:embed="rId3" cstate="print">
             <a:extLst>
               <a:ext uri="{28A0092B-C50C-407E-A947-70E740481C1C}">
                 <a14:useLocalDpi xmlns:a14="http://schemas.microsoft.com/office/drawing/2010/main" val="0"/>
@@ -8928,7 +8988,7 @@
           <p:nvPr userDrawn="1"/>
         </p:nvPicPr>
         <p:blipFill>
-          <a:blip r:embed="rId3">
+          <a:blip r:embed="rId4">
             <a:extLst>
               <a:ext uri="{28A0092B-C50C-407E-A947-70E740481C1C}">
                 <a14:useLocalDpi xmlns:a14="http://schemas.microsoft.com/office/drawing/2010/main" val="0"/>
@@ -8941,7 +9001,7 @@
         </p:blipFill>
         <p:spPr>
           <a:xfrm>
-            <a:off x="502065" y="3841750"/>
+            <a:off x="3037030" y="3832697"/>
             <a:ext cx="869535" cy="628650"/>
           </a:xfrm>
           <a:prstGeom prst="rect">
@@ -8949,66 +9009,6 @@
           </a:prstGeom>
         </p:spPr>
       </p:pic>
-      <p:sp>
-        <p:nvSpPr>
-          <p:cNvPr id="16" name="Rounded Rectangle 15">
-            <a:extLst>
-              <a:ext uri="{FF2B5EF4-FFF2-40B4-BE49-F238E27FC236}">
-                <a16:creationId xmlns:a16="http://schemas.microsoft.com/office/drawing/2014/main" id="{EEEED746-E923-6546-AEBB-C34B388F17E3}"/>
-              </a:ext>
-              <a:ext uri="{C183D7F6-B498-43B3-948B-1728B52AA6E4}">
-                <adec:decorative xmlns:adec="http://schemas.microsoft.com/office/drawing/2017/decorative" val="1"/>
-              </a:ext>
-            </a:extLst>
-          </p:cNvPr>
-          <p:cNvSpPr/>
-          <p:nvPr userDrawn="1"/>
-        </p:nvSpPr>
-        <p:spPr>
-          <a:xfrm>
-            <a:off x="1697445" y="3752495"/>
-            <a:ext cx="2202419" cy="779487"/>
-          </a:xfrm>
-          <a:prstGeom prst="roundRect">
-            <a:avLst>
-              <a:gd name="adj" fmla="val 20191"/>
-            </a:avLst>
-          </a:prstGeom>
-          <a:blipFill>
-            <a:blip r:embed="rId4"/>
-            <a:stretch>
-              <a:fillRect/>
-            </a:stretch>
-          </a:blipFill>
-          <a:ln>
-            <a:noFill/>
-          </a:ln>
-        </p:spPr>
-        <p:style>
-          <a:lnRef idx="2">
-            <a:schemeClr val="accent1">
-              <a:shade val="50000"/>
-            </a:schemeClr>
-          </a:lnRef>
-          <a:fillRef idx="1">
-            <a:schemeClr val="accent1"/>
-          </a:fillRef>
-          <a:effectRef idx="0">
-            <a:schemeClr val="accent1"/>
-          </a:effectRef>
-          <a:fontRef idx="minor">
-            <a:schemeClr val="lt1"/>
-          </a:fontRef>
-        </p:style>
-        <p:txBody>
-          <a:bodyPr rtlCol="0" anchor="ctr"/>
-          <a:lstStyle/>
-          <a:p>
-            <a:pPr algn="ctr"/>
-            <a:endParaRPr lang="en-US" dirty="0"/>
-          </a:p>
-        </p:txBody>
-      </p:sp>
       <p:sp>
         <p:nvSpPr>
           <p:cNvPr id="19" name="Rounded Rectangle 18">
@@ -9741,92 +9741,12 @@
           </a:prstGeom>
         </p:spPr>
       </p:pic>
-      <p:pic>
-        <p:nvPicPr>
-          <p:cNvPr id="18" name="Picture 17" descr="A picture containing food&#10;&#10;Description automatically generated">
+      <p:sp>
+        <p:nvSpPr>
+          <p:cNvPr id="21" name="Rounded Rectangle 20">
             <a:extLst>
               <a:ext uri="{FF2B5EF4-FFF2-40B4-BE49-F238E27FC236}">
-                <a16:creationId xmlns:a16="http://schemas.microsoft.com/office/drawing/2014/main" id="{F62C7DA8-D020-0644-8538-D04122C4CB47}"/>
-              </a:ext>
-            </a:extLst>
-          </p:cNvPr>
-          <p:cNvPicPr>
-            <a:picLocks noChangeAspect="1"/>
-          </p:cNvPicPr>
-          <p:nvPr userDrawn="1"/>
-        </p:nvPicPr>
-        <p:blipFill rotWithShape="1">
-          <a:blip r:embed="rId5">
-            <a:extLst>
-              <a:ext uri="{28A0092B-C50C-407E-A947-70E740481C1C}">
-                <a14:useLocalDpi xmlns:a14="http://schemas.microsoft.com/office/drawing/2010/main" val="0"/>
-              </a:ext>
-            </a:extLst>
-          </a:blip>
-          <a:srcRect r="3763" b="19294"/>
-          <a:stretch/>
-        </p:blipFill>
-        <p:spPr>
-          <a:xfrm>
-            <a:off x="6066692" y="4354414"/>
-            <a:ext cx="842588" cy="510860"/>
-          </a:xfrm>
-          <a:prstGeom prst="rect">
-            <a:avLst/>
-          </a:prstGeom>
-        </p:spPr>
-      </p:pic>
-      <p:pic>
-        <p:nvPicPr>
-          <p:cNvPr id="19" name="Picture 18">
-            <a:extLst>
-              <a:ext uri="{FF2B5EF4-FFF2-40B4-BE49-F238E27FC236}">
-                <a16:creationId xmlns:a16="http://schemas.microsoft.com/office/drawing/2014/main" id="{9BA023CD-06CD-7D40-AFA8-BBD42D3960F9}"/>
-              </a:ext>
-            </a:extLst>
-          </p:cNvPr>
-          <p:cNvPicPr>
-            <a:picLocks noChangeAspect="1"/>
-          </p:cNvPicPr>
-          <p:nvPr userDrawn="1"/>
-        </p:nvPicPr>
-        <p:blipFill>
-          <a:blip r:embed="rId6">
-            <a:extLst>
-              <a:ext uri="{BEBA8EAE-BF5A-486C-A8C5-ECC9F3942E4B}">
-                <a14:imgProps xmlns:a14="http://schemas.microsoft.com/office/drawing/2010/main">
-                  <a14:imgLayer r:embed="rId7">
-                    <a14:imgEffect>
-                      <a14:brightnessContrast bright="100000"/>
-                    </a14:imgEffect>
-                  </a14:imgLayer>
-                </a14:imgProps>
-              </a:ext>
-              <a:ext uri="{28A0092B-C50C-407E-A947-70E740481C1C}">
-                <a14:useLocalDpi xmlns:a14="http://schemas.microsoft.com/office/drawing/2010/main" val="0"/>
-              </a:ext>
-            </a:extLst>
-          </a:blip>
-          <a:stretch>
-            <a:fillRect/>
-          </a:stretch>
-        </p:blipFill>
-        <p:spPr>
-          <a:xfrm>
-            <a:off x="6068631" y="4866336"/>
-            <a:ext cx="875574" cy="121925"/>
-          </a:xfrm>
-          <a:prstGeom prst="rect">
-            <a:avLst/>
-          </a:prstGeom>
-        </p:spPr>
-      </p:pic>
-      <p:sp>
-        <p:nvSpPr>
-          <p:cNvPr id="20" name="Rounded Rectangle 19">
-            <a:extLst>
-              <a:ext uri="{FF2B5EF4-FFF2-40B4-BE49-F238E27FC236}">
-                <a16:creationId xmlns:a16="http://schemas.microsoft.com/office/drawing/2014/main" id="{186BE9C9-901A-474B-8402-9BAB1041DCD3}"/>
+                <a16:creationId xmlns:a16="http://schemas.microsoft.com/office/drawing/2014/main" id="{9927877F-2A99-6B43-9127-F35EF25914EF}"/>
               </a:ext>
             </a:extLst>
           </p:cNvPr>
@@ -9835,7 +9755,7 @@
         </p:nvSpPr>
         <p:spPr>
           <a:xfrm>
-            <a:off x="7404921" y="4409128"/>
+            <a:off x="5949003" y="4404774"/>
             <a:ext cx="1591642" cy="563319"/>
           </a:xfrm>
           <a:prstGeom prst="roundRect">
@@ -9844,7 +9764,7 @@
             </a:avLst>
           </a:prstGeom>
           <a:blipFill>
-            <a:blip r:embed="rId8"/>
+            <a:blip r:embed="rId5"/>
             <a:stretch>
               <a:fillRect/>
             </a:stretch>
@@ -9878,6 +9798,86 @@
           </a:p>
         </p:txBody>
       </p:sp>
+      <p:pic>
+        <p:nvPicPr>
+          <p:cNvPr id="22" name="Picture 21" descr="A picture containing food&#10;&#10;Description automatically generated">
+            <a:extLst>
+              <a:ext uri="{FF2B5EF4-FFF2-40B4-BE49-F238E27FC236}">
+                <a16:creationId xmlns:a16="http://schemas.microsoft.com/office/drawing/2014/main" id="{19956728-9F2B-F348-B525-C417FCAE389B}"/>
+              </a:ext>
+            </a:extLst>
+          </p:cNvPr>
+          <p:cNvPicPr>
+            <a:picLocks noChangeAspect="1"/>
+          </p:cNvPicPr>
+          <p:nvPr userDrawn="1"/>
+        </p:nvPicPr>
+        <p:blipFill rotWithShape="1">
+          <a:blip r:embed="rId6">
+            <a:extLst>
+              <a:ext uri="{28A0092B-C50C-407E-A947-70E740481C1C}">
+                <a14:useLocalDpi xmlns:a14="http://schemas.microsoft.com/office/drawing/2010/main" val="0"/>
+              </a:ext>
+            </a:extLst>
+          </a:blip>
+          <a:srcRect r="3763" b="19294"/>
+          <a:stretch/>
+        </p:blipFill>
+        <p:spPr>
+          <a:xfrm>
+            <a:off x="7913604" y="4354414"/>
+            <a:ext cx="842588" cy="510860"/>
+          </a:xfrm>
+          <a:prstGeom prst="rect">
+            <a:avLst/>
+          </a:prstGeom>
+        </p:spPr>
+      </p:pic>
+      <p:pic>
+        <p:nvPicPr>
+          <p:cNvPr id="23" name="Picture 22">
+            <a:extLst>
+              <a:ext uri="{FF2B5EF4-FFF2-40B4-BE49-F238E27FC236}">
+                <a16:creationId xmlns:a16="http://schemas.microsoft.com/office/drawing/2014/main" id="{EC75BF78-394C-3E4D-84A2-3803C8C81AB1}"/>
+              </a:ext>
+            </a:extLst>
+          </p:cNvPr>
+          <p:cNvPicPr>
+            <a:picLocks noChangeAspect="1"/>
+          </p:cNvPicPr>
+          <p:nvPr userDrawn="1"/>
+        </p:nvPicPr>
+        <p:blipFill>
+          <a:blip r:embed="rId7">
+            <a:extLst>
+              <a:ext uri="{BEBA8EAE-BF5A-486C-A8C5-ECC9F3942E4B}">
+                <a14:imgProps xmlns:a14="http://schemas.microsoft.com/office/drawing/2010/main">
+                  <a14:imgLayer r:embed="rId8">
+                    <a14:imgEffect>
+                      <a14:brightnessContrast bright="100000"/>
+                    </a14:imgEffect>
+                  </a14:imgLayer>
+                </a14:imgProps>
+              </a:ext>
+              <a:ext uri="{28A0092B-C50C-407E-A947-70E740481C1C}">
+                <a14:useLocalDpi xmlns:a14="http://schemas.microsoft.com/office/drawing/2010/main" val="0"/>
+              </a:ext>
+            </a:extLst>
+          </a:blip>
+          <a:stretch>
+            <a:fillRect/>
+          </a:stretch>
+        </p:blipFill>
+        <p:spPr>
+          <a:xfrm>
+            <a:off x="7915543" y="4866336"/>
+            <a:ext cx="875574" cy="121925"/>
+          </a:xfrm>
+          <a:prstGeom prst="rect">
+            <a:avLst/>
+          </a:prstGeom>
+        </p:spPr>
+      </p:pic>
     </p:spTree>
     <p:extLst>
       <p:ext uri="{BB962C8B-B14F-4D97-AF65-F5344CB8AC3E}">
@@ -10375,6 +10375,63 @@
       </p:grpSpPr>
       <p:sp>
         <p:nvSpPr>
+          <p:cNvPr id="16" name="Rounded Rectangle 15">
+            <a:extLst>
+              <a:ext uri="{FF2B5EF4-FFF2-40B4-BE49-F238E27FC236}">
+                <a16:creationId xmlns:a16="http://schemas.microsoft.com/office/drawing/2014/main" id="{2A7FE788-07D6-D04D-953C-29469F232396}"/>
+              </a:ext>
+            </a:extLst>
+          </p:cNvPr>
+          <p:cNvSpPr/>
+          <p:nvPr userDrawn="1"/>
+        </p:nvSpPr>
+        <p:spPr>
+          <a:xfrm>
+            <a:off x="150416" y="4424667"/>
+            <a:ext cx="1404530" cy="497096"/>
+          </a:xfrm>
+          <a:prstGeom prst="roundRect">
+            <a:avLst>
+              <a:gd name="adj" fmla="val 20191"/>
+            </a:avLst>
+          </a:prstGeom>
+          <a:blipFill>
+            <a:blip r:embed="rId2"/>
+            <a:stretch>
+              <a:fillRect/>
+            </a:stretch>
+          </a:blipFill>
+          <a:ln>
+            <a:noFill/>
+          </a:ln>
+        </p:spPr>
+        <p:style>
+          <a:lnRef idx="2">
+            <a:schemeClr val="accent1">
+              <a:shade val="50000"/>
+            </a:schemeClr>
+          </a:lnRef>
+          <a:fillRef idx="1">
+            <a:schemeClr val="accent1"/>
+          </a:fillRef>
+          <a:effectRef idx="0">
+            <a:schemeClr val="accent1"/>
+          </a:effectRef>
+          <a:fontRef idx="minor">
+            <a:schemeClr val="lt1"/>
+          </a:fontRef>
+        </p:style>
+        <p:txBody>
+          <a:bodyPr rtlCol="0" anchor="ctr"/>
+          <a:lstStyle/>
+          <a:p>
+            <a:pPr algn="ctr"/>
+            <a:endParaRPr lang="en-US" dirty="0"/>
+          </a:p>
+        </p:txBody>
+      </p:sp>
+      <p:sp>
+        <p:nvSpPr>
           <p:cNvPr id="8" name="Rectangle 7"/>
           <p:cNvSpPr>
             <a:spLocks noChangeArrowheads="1"/>
@@ -10852,63 +10909,6 @@
           </p:txBody>
         </p:sp>
       </p:grpSp>
-      <p:sp>
-        <p:nvSpPr>
-          <p:cNvPr id="14" name="Rounded Rectangle 13">
-            <a:extLst>
-              <a:ext uri="{FF2B5EF4-FFF2-40B4-BE49-F238E27FC236}">
-                <a16:creationId xmlns:a16="http://schemas.microsoft.com/office/drawing/2014/main" id="{5ACE5150-2741-114A-9231-1F74BD44ACAC}"/>
-              </a:ext>
-            </a:extLst>
-          </p:cNvPr>
-          <p:cNvSpPr/>
-          <p:nvPr userDrawn="1"/>
-        </p:nvSpPr>
-        <p:spPr>
-          <a:xfrm>
-            <a:off x="914400" y="4424667"/>
-            <a:ext cx="1404530" cy="497096"/>
-          </a:xfrm>
-          <a:prstGeom prst="roundRect">
-            <a:avLst>
-              <a:gd name="adj" fmla="val 20191"/>
-            </a:avLst>
-          </a:prstGeom>
-          <a:blipFill>
-            <a:blip r:embed="rId2"/>
-            <a:stretch>
-              <a:fillRect/>
-            </a:stretch>
-          </a:blipFill>
-          <a:ln>
-            <a:noFill/>
-          </a:ln>
-        </p:spPr>
-        <p:style>
-          <a:lnRef idx="2">
-            <a:schemeClr val="accent1">
-              <a:shade val="50000"/>
-            </a:schemeClr>
-          </a:lnRef>
-          <a:fillRef idx="1">
-            <a:schemeClr val="accent1"/>
-          </a:fillRef>
-          <a:effectRef idx="0">
-            <a:schemeClr val="accent1"/>
-          </a:effectRef>
-          <a:fontRef idx="minor">
-            <a:schemeClr val="lt1"/>
-          </a:fontRef>
-        </p:style>
-        <p:txBody>
-          <a:bodyPr rtlCol="0" anchor="ctr"/>
-          <a:lstStyle/>
-          <a:p>
-            <a:pPr algn="ctr"/>
-            <a:endParaRPr lang="en-US" dirty="0"/>
-          </a:p>
-        </p:txBody>
-      </p:sp>
       <p:pic>
         <p:nvPicPr>
           <p:cNvPr id="15" name="Picture 14" descr="A picture containing food&#10;&#10;Description automatically generated">
@@ -10937,7 +10937,7 @@
         </p:blipFill>
         <p:spPr>
           <a:xfrm>
-            <a:off x="251010" y="4493208"/>
+            <a:off x="1753887" y="4493208"/>
             <a:ext cx="510990" cy="369432"/>
           </a:xfrm>
           <a:prstGeom prst="rect">
@@ -12161,10 +12161,10 @@
       </p:grpSp>
       <p:sp>
         <p:nvSpPr>
-          <p:cNvPr id="22" name="Rounded Rectangle 21">
+          <p:cNvPr id="30" name="Rounded Rectangle 29">
             <a:extLst>
               <a:ext uri="{FF2B5EF4-FFF2-40B4-BE49-F238E27FC236}">
-                <a16:creationId xmlns:a16="http://schemas.microsoft.com/office/drawing/2014/main" id="{C1C6E99B-972F-3542-83F5-A2361ABDDFA4}"/>
+                <a16:creationId xmlns:a16="http://schemas.microsoft.com/office/drawing/2014/main" id="{6BE5071B-286B-C84F-A11A-FA15689C0AB2}"/>
               </a:ext>
             </a:extLst>
           </p:cNvPr>
@@ -12173,7 +12173,7 @@
         </p:nvSpPr>
         <p:spPr>
           <a:xfrm>
-            <a:off x="914400" y="4424667"/>
+            <a:off x="150416" y="4424667"/>
             <a:ext cx="1404530" cy="497096"/>
           </a:xfrm>
           <a:prstGeom prst="roundRect">
@@ -12218,10 +12218,10 @@
       </p:sp>
       <p:pic>
         <p:nvPicPr>
-          <p:cNvPr id="26" name="Picture 25" descr="A picture containing food&#10;&#10;Description automatically generated">
+          <p:cNvPr id="31" name="Picture 30" descr="A picture containing food&#10;&#10;Description automatically generated">
             <a:extLst>
               <a:ext uri="{FF2B5EF4-FFF2-40B4-BE49-F238E27FC236}">
-                <a16:creationId xmlns:a16="http://schemas.microsoft.com/office/drawing/2014/main" id="{B8094C8C-A044-CD42-9128-A2EB35D11CAE}"/>
+                <a16:creationId xmlns:a16="http://schemas.microsoft.com/office/drawing/2014/main" id="{4A32437F-C079-FE4C-BEF2-C9D06EFC8376}"/>
               </a:ext>
             </a:extLst>
           </p:cNvPr>
@@ -12244,7 +12244,7 @@
         </p:blipFill>
         <p:spPr>
           <a:xfrm>
-            <a:off x="251010" y="4493208"/>
+            <a:off x="1753887" y="4493208"/>
             <a:ext cx="510990" cy="369432"/>
           </a:xfrm>
           <a:prstGeom prst="rect">
@@ -12989,6 +12989,63 @@
       </p:grpSpPr>
       <p:sp>
         <p:nvSpPr>
+          <p:cNvPr id="9" name="Rounded Rectangle 8">
+            <a:extLst>
+              <a:ext uri="{FF2B5EF4-FFF2-40B4-BE49-F238E27FC236}">
+                <a16:creationId xmlns:a16="http://schemas.microsoft.com/office/drawing/2014/main" id="{43F8BE62-9556-AE4D-8EF8-6EFA4F9856B3}"/>
+              </a:ext>
+            </a:extLst>
+          </p:cNvPr>
+          <p:cNvSpPr/>
+          <p:nvPr userDrawn="1"/>
+        </p:nvSpPr>
+        <p:spPr>
+          <a:xfrm>
+            <a:off x="417949" y="4030406"/>
+            <a:ext cx="2036355" cy="720713"/>
+          </a:xfrm>
+          <a:prstGeom prst="roundRect">
+            <a:avLst>
+              <a:gd name="adj" fmla="val 20191"/>
+            </a:avLst>
+          </a:prstGeom>
+          <a:blipFill>
+            <a:blip r:embed="rId2"/>
+            <a:stretch>
+              <a:fillRect/>
+            </a:stretch>
+          </a:blipFill>
+          <a:ln>
+            <a:noFill/>
+          </a:ln>
+        </p:spPr>
+        <p:style>
+          <a:lnRef idx="2">
+            <a:schemeClr val="accent1">
+              <a:shade val="50000"/>
+            </a:schemeClr>
+          </a:lnRef>
+          <a:fillRef idx="1">
+            <a:schemeClr val="accent1"/>
+          </a:fillRef>
+          <a:effectRef idx="0">
+            <a:schemeClr val="accent1"/>
+          </a:effectRef>
+          <a:fontRef idx="minor">
+            <a:schemeClr val="lt1"/>
+          </a:fontRef>
+        </p:style>
+        <p:txBody>
+          <a:bodyPr rtlCol="0" anchor="ctr"/>
+          <a:lstStyle/>
+          <a:p>
+            <a:pPr algn="ctr"/>
+            <a:endParaRPr lang="en-US" dirty="0"/>
+          </a:p>
+        </p:txBody>
+      </p:sp>
+      <p:sp>
+        <p:nvSpPr>
           <p:cNvPr id="2" name="Title 1"/>
           <p:cNvSpPr>
             <a:spLocks noGrp="1"/>
@@ -13145,63 +13202,6 @@
           </a:p>
         </p:txBody>
       </p:sp>
-      <p:sp>
-        <p:nvSpPr>
-          <p:cNvPr id="6" name="Rounded Rectangle 5">
-            <a:extLst>
-              <a:ext uri="{FF2B5EF4-FFF2-40B4-BE49-F238E27FC236}">
-                <a16:creationId xmlns:a16="http://schemas.microsoft.com/office/drawing/2014/main" id="{38C7516A-A078-2845-89FF-82A44E4BC5AD}"/>
-              </a:ext>
-            </a:extLst>
-          </p:cNvPr>
-          <p:cNvSpPr/>
-          <p:nvPr userDrawn="1"/>
-        </p:nvSpPr>
-        <p:spPr>
-          <a:xfrm>
-            <a:off x="1886913" y="4019550"/>
-            <a:ext cx="2036355" cy="720713"/>
-          </a:xfrm>
-          <a:prstGeom prst="roundRect">
-            <a:avLst>
-              <a:gd name="adj" fmla="val 20191"/>
-            </a:avLst>
-          </a:prstGeom>
-          <a:blipFill>
-            <a:blip r:embed="rId2"/>
-            <a:stretch>
-              <a:fillRect/>
-            </a:stretch>
-          </a:blipFill>
-          <a:ln>
-            <a:noFill/>
-          </a:ln>
-        </p:spPr>
-        <p:style>
-          <a:lnRef idx="2">
-            <a:schemeClr val="accent1">
-              <a:shade val="50000"/>
-            </a:schemeClr>
-          </a:lnRef>
-          <a:fillRef idx="1">
-            <a:schemeClr val="accent1"/>
-          </a:fillRef>
-          <a:effectRef idx="0">
-            <a:schemeClr val="accent1"/>
-          </a:effectRef>
-          <a:fontRef idx="minor">
-            <a:schemeClr val="lt1"/>
-          </a:fontRef>
-        </p:style>
-        <p:txBody>
-          <a:bodyPr rtlCol="0" anchor="ctr"/>
-          <a:lstStyle/>
-          <a:p>
-            <a:pPr algn="ctr"/>
-            <a:endParaRPr lang="en-US" dirty="0"/>
-          </a:p>
-        </p:txBody>
-      </p:sp>
       <p:pic>
         <p:nvPicPr>
           <p:cNvPr id="7" name="Picture 6" descr="A picture containing food&#10;&#10;Description automatically generated">
@@ -13229,7 +13229,7 @@
         </p:blipFill>
         <p:spPr>
           <a:xfrm>
-            <a:off x="440924" y="4030406"/>
+            <a:off x="2912518" y="4030406"/>
             <a:ext cx="996875" cy="602071"/>
           </a:xfrm>
           <a:prstGeom prst="rect">
@@ -13274,7 +13274,7 @@
         </p:blipFill>
         <p:spPr>
           <a:xfrm>
-            <a:off x="440924" y="4646083"/>
+            <a:off x="2912518" y="4646083"/>
             <a:ext cx="1032012" cy="143709"/>
           </a:xfrm>
           <a:prstGeom prst="rect">
@@ -13519,10 +13519,10 @@
       </p:sp>
       <p:sp>
         <p:nvSpPr>
-          <p:cNvPr id="7" name="Rounded Rectangle 6">
+          <p:cNvPr id="13" name="Rounded Rectangle 12">
             <a:extLst>
               <a:ext uri="{FF2B5EF4-FFF2-40B4-BE49-F238E27FC236}">
-                <a16:creationId xmlns:a16="http://schemas.microsoft.com/office/drawing/2014/main" id="{3FA3AA22-09F7-064F-B67C-622FB4B205D4}"/>
+                <a16:creationId xmlns:a16="http://schemas.microsoft.com/office/drawing/2014/main" id="{33C8491F-9F4B-F64D-9803-64DB90F4AA9D}"/>
               </a:ext>
             </a:extLst>
           </p:cNvPr>
@@ -13531,7 +13531,7 @@
         </p:nvSpPr>
         <p:spPr>
           <a:xfrm>
-            <a:off x="1886913" y="4019550"/>
+            <a:off x="417949" y="4030406"/>
             <a:ext cx="2036355" cy="720713"/>
           </a:xfrm>
           <a:prstGeom prst="roundRect">
@@ -13576,10 +13576,10 @@
       </p:sp>
       <p:pic>
         <p:nvPicPr>
-          <p:cNvPr id="8" name="Picture 7" descr="A picture containing food&#10;&#10;Description automatically generated">
+          <p:cNvPr id="14" name="Picture 13" descr="A picture containing food&#10;&#10;Description automatically generated">
             <a:extLst>
               <a:ext uri="{FF2B5EF4-FFF2-40B4-BE49-F238E27FC236}">
-                <a16:creationId xmlns:a16="http://schemas.microsoft.com/office/drawing/2014/main" id="{AF5DE43C-A5B4-0745-A95A-2B3BDE50E318}"/>
+                <a16:creationId xmlns:a16="http://schemas.microsoft.com/office/drawing/2014/main" id="{C144D369-A9D3-5F4E-ACE8-F645AA820B61}"/>
               </a:ext>
             </a:extLst>
           </p:cNvPr>
@@ -13601,7 +13601,7 @@
         </p:blipFill>
         <p:spPr>
           <a:xfrm>
-            <a:off x="440924" y="4030406"/>
+            <a:off x="2912518" y="4030406"/>
             <a:ext cx="996875" cy="602071"/>
           </a:xfrm>
           <a:prstGeom prst="rect">
@@ -13611,10 +13611,10 @@
       </p:pic>
       <p:pic>
         <p:nvPicPr>
-          <p:cNvPr id="9" name="Picture 8">
+          <p:cNvPr id="15" name="Picture 14">
             <a:extLst>
               <a:ext uri="{FF2B5EF4-FFF2-40B4-BE49-F238E27FC236}">
-                <a16:creationId xmlns:a16="http://schemas.microsoft.com/office/drawing/2014/main" id="{1333D0F0-3AD7-4F43-B669-E394B3E954C6}"/>
+                <a16:creationId xmlns:a16="http://schemas.microsoft.com/office/drawing/2014/main" id="{25A088DB-F588-9740-A115-AAFDEB437829}"/>
               </a:ext>
             </a:extLst>
           </p:cNvPr>
@@ -13646,7 +13646,7 @@
         </p:blipFill>
         <p:spPr>
           <a:xfrm>
-            <a:off x="440924" y="4646083"/>
+            <a:off x="2912518" y="4646083"/>
             <a:ext cx="1032012" cy="143709"/>
           </a:xfrm>
           <a:prstGeom prst="rect">
@@ -14313,92 +14313,12 @@
           </a:prstGeom>
         </p:spPr>
       </p:pic>
-      <p:pic>
-        <p:nvPicPr>
-          <p:cNvPr id="17" name="Picture 16" descr="A picture containing food&#10;&#10;Description automatically generated">
+      <p:sp>
+        <p:nvSpPr>
+          <p:cNvPr id="21" name="Rounded Rectangle 20">
             <a:extLst>
               <a:ext uri="{FF2B5EF4-FFF2-40B4-BE49-F238E27FC236}">
-                <a16:creationId xmlns:a16="http://schemas.microsoft.com/office/drawing/2014/main" id="{85D04762-AE68-3547-9637-CC2CD7FD3996}"/>
-              </a:ext>
-            </a:extLst>
-          </p:cNvPr>
-          <p:cNvPicPr>
-            <a:picLocks noChangeAspect="1"/>
-          </p:cNvPicPr>
-          <p:nvPr userDrawn="1"/>
-        </p:nvPicPr>
-        <p:blipFill rotWithShape="1">
-          <a:blip r:embed="rId5">
-            <a:extLst>
-              <a:ext uri="{28A0092B-C50C-407E-A947-70E740481C1C}">
-                <a14:useLocalDpi xmlns:a14="http://schemas.microsoft.com/office/drawing/2010/main" val="0"/>
-              </a:ext>
-            </a:extLst>
-          </a:blip>
-          <a:srcRect r="3763" b="19294"/>
-          <a:stretch/>
-        </p:blipFill>
-        <p:spPr>
-          <a:xfrm>
-            <a:off x="6066692" y="4354414"/>
-            <a:ext cx="842588" cy="510860"/>
-          </a:xfrm>
-          <a:prstGeom prst="rect">
-            <a:avLst/>
-          </a:prstGeom>
-        </p:spPr>
-      </p:pic>
-      <p:pic>
-        <p:nvPicPr>
-          <p:cNvPr id="19" name="Picture 18">
-            <a:extLst>
-              <a:ext uri="{FF2B5EF4-FFF2-40B4-BE49-F238E27FC236}">
-                <a16:creationId xmlns:a16="http://schemas.microsoft.com/office/drawing/2014/main" id="{6903104F-1A11-504B-8ED7-B4A02B38C7AB}"/>
-              </a:ext>
-            </a:extLst>
-          </p:cNvPr>
-          <p:cNvPicPr>
-            <a:picLocks noChangeAspect="1"/>
-          </p:cNvPicPr>
-          <p:nvPr userDrawn="1"/>
-        </p:nvPicPr>
-        <p:blipFill>
-          <a:blip r:embed="rId6">
-            <a:extLst>
-              <a:ext uri="{BEBA8EAE-BF5A-486C-A8C5-ECC9F3942E4B}">
-                <a14:imgProps xmlns:a14="http://schemas.microsoft.com/office/drawing/2010/main">
-                  <a14:imgLayer r:embed="rId7">
-                    <a14:imgEffect>
-                      <a14:brightnessContrast bright="100000"/>
-                    </a14:imgEffect>
-                  </a14:imgLayer>
-                </a14:imgProps>
-              </a:ext>
-              <a:ext uri="{28A0092B-C50C-407E-A947-70E740481C1C}">
-                <a14:useLocalDpi xmlns:a14="http://schemas.microsoft.com/office/drawing/2010/main" val="0"/>
-              </a:ext>
-            </a:extLst>
-          </a:blip>
-          <a:stretch>
-            <a:fillRect/>
-          </a:stretch>
-        </p:blipFill>
-        <p:spPr>
-          <a:xfrm>
-            <a:off x="6068631" y="4866336"/>
-            <a:ext cx="875574" cy="121925"/>
-          </a:xfrm>
-          <a:prstGeom prst="rect">
-            <a:avLst/>
-          </a:prstGeom>
-        </p:spPr>
-      </p:pic>
-      <p:sp>
-        <p:nvSpPr>
-          <p:cNvPr id="20" name="Rounded Rectangle 19">
-            <a:extLst>
-              <a:ext uri="{FF2B5EF4-FFF2-40B4-BE49-F238E27FC236}">
-                <a16:creationId xmlns:a16="http://schemas.microsoft.com/office/drawing/2014/main" id="{5AF9AA5C-48E9-814A-A9C7-F0DAFAF64B8B}"/>
+                <a16:creationId xmlns:a16="http://schemas.microsoft.com/office/drawing/2014/main" id="{D2A942B3-EA66-0843-B2F6-02EFED9B010D}"/>
               </a:ext>
             </a:extLst>
           </p:cNvPr>
@@ -14407,7 +14327,7 @@
         </p:nvSpPr>
         <p:spPr>
           <a:xfrm>
-            <a:off x="7404921" y="4409128"/>
+            <a:off x="5949003" y="4404774"/>
             <a:ext cx="1591642" cy="563319"/>
           </a:xfrm>
           <a:prstGeom prst="roundRect">
@@ -14416,7 +14336,7 @@
             </a:avLst>
           </a:prstGeom>
           <a:blipFill>
-            <a:blip r:embed="rId8"/>
+            <a:blip r:embed="rId5"/>
             <a:stretch>
               <a:fillRect/>
             </a:stretch>
@@ -14450,6 +14370,86 @@
           </a:p>
         </p:txBody>
       </p:sp>
+      <p:pic>
+        <p:nvPicPr>
+          <p:cNvPr id="17" name="Picture 16" descr="A picture containing food&#10;&#10;Description automatically generated">
+            <a:extLst>
+              <a:ext uri="{FF2B5EF4-FFF2-40B4-BE49-F238E27FC236}">
+                <a16:creationId xmlns:a16="http://schemas.microsoft.com/office/drawing/2014/main" id="{85D04762-AE68-3547-9637-CC2CD7FD3996}"/>
+              </a:ext>
+            </a:extLst>
+          </p:cNvPr>
+          <p:cNvPicPr>
+            <a:picLocks noChangeAspect="1"/>
+          </p:cNvPicPr>
+          <p:nvPr userDrawn="1"/>
+        </p:nvPicPr>
+        <p:blipFill rotWithShape="1">
+          <a:blip r:embed="rId6">
+            <a:extLst>
+              <a:ext uri="{28A0092B-C50C-407E-A947-70E740481C1C}">
+                <a14:useLocalDpi xmlns:a14="http://schemas.microsoft.com/office/drawing/2010/main" val="0"/>
+              </a:ext>
+            </a:extLst>
+          </a:blip>
+          <a:srcRect r="3763" b="19294"/>
+          <a:stretch/>
+        </p:blipFill>
+        <p:spPr>
+          <a:xfrm>
+            <a:off x="7913604" y="4354414"/>
+            <a:ext cx="842588" cy="510860"/>
+          </a:xfrm>
+          <a:prstGeom prst="rect">
+            <a:avLst/>
+          </a:prstGeom>
+        </p:spPr>
+      </p:pic>
+      <p:pic>
+        <p:nvPicPr>
+          <p:cNvPr id="19" name="Picture 18">
+            <a:extLst>
+              <a:ext uri="{FF2B5EF4-FFF2-40B4-BE49-F238E27FC236}">
+                <a16:creationId xmlns:a16="http://schemas.microsoft.com/office/drawing/2014/main" id="{6903104F-1A11-504B-8ED7-B4A02B38C7AB}"/>
+              </a:ext>
+            </a:extLst>
+          </p:cNvPr>
+          <p:cNvPicPr>
+            <a:picLocks noChangeAspect="1"/>
+          </p:cNvPicPr>
+          <p:nvPr userDrawn="1"/>
+        </p:nvPicPr>
+        <p:blipFill>
+          <a:blip r:embed="rId7">
+            <a:extLst>
+              <a:ext uri="{BEBA8EAE-BF5A-486C-A8C5-ECC9F3942E4B}">
+                <a14:imgProps xmlns:a14="http://schemas.microsoft.com/office/drawing/2010/main">
+                  <a14:imgLayer r:embed="rId8">
+                    <a14:imgEffect>
+                      <a14:brightnessContrast bright="100000"/>
+                    </a14:imgEffect>
+                  </a14:imgLayer>
+                </a14:imgProps>
+              </a:ext>
+              <a:ext uri="{28A0092B-C50C-407E-A947-70E740481C1C}">
+                <a14:useLocalDpi xmlns:a14="http://schemas.microsoft.com/office/drawing/2010/main" val="0"/>
+              </a:ext>
+            </a:extLst>
+          </a:blip>
+          <a:stretch>
+            <a:fillRect/>
+          </a:stretch>
+        </p:blipFill>
+        <p:spPr>
+          <a:xfrm>
+            <a:off x="7915543" y="4866336"/>
+            <a:ext cx="875574" cy="121925"/>
+          </a:xfrm>
+          <a:prstGeom prst="rect">
+            <a:avLst/>
+          </a:prstGeom>
+        </p:spPr>
+      </p:pic>
     </p:spTree>
     <p:extLst>
       <p:ext uri="{BB962C8B-B14F-4D97-AF65-F5344CB8AC3E}">
@@ -15166,8 +15166,8 @@
         </p:blipFill>
         <p:spPr>
           <a:xfrm>
-            <a:off x="1261694" y="895570"/>
-            <a:ext cx="6620611" cy="3597727"/>
+            <a:off x="1464174" y="882917"/>
+            <a:ext cx="6215651" cy="3377666"/>
           </a:xfrm>
           <a:prstGeom prst="rect">
             <a:avLst/>
@@ -16052,7 +16052,7 @@
         </p:nvSpPr>
         <p:spPr>
           <a:xfrm>
-            <a:off x="457200" y="1077398"/>
+            <a:off x="457200" y="1034628"/>
             <a:ext cx="8158294" cy="3341688"/>
           </a:xfrm>
         </p:spPr>
@@ -17455,7 +17455,7 @@
         </p:nvSpPr>
         <p:spPr>
           <a:xfrm>
-            <a:off x="457200" y="1158875"/>
+            <a:off x="457200" y="1077398"/>
             <a:ext cx="8158294" cy="3341688"/>
           </a:xfrm>
         </p:spPr>
@@ -17958,7 +17958,7 @@
         </p:nvSpPr>
         <p:spPr>
           <a:xfrm>
-            <a:off x="457200" y="1050239"/>
+            <a:off x="457200" y="1007109"/>
             <a:ext cx="8158294" cy="3341688"/>
           </a:xfrm>
         </p:spPr>

</xml_diff>